<commit_message>
herasoo commit by hp
</commit_message>
<xml_diff>
--- a/deliverables/13. Tech Support/istio/Istio 솔루션 소개.pptx
+++ b/deliverables/13. Tech Support/istio/Istio 솔루션 소개.pptx
@@ -213,7 +213,7 @@
           <a:p>
             <a:fld id="{6A5FDA30-7426-4308-B6AF-FFBCE9781BF1}" type="datetimeFigureOut">
               <a:rPr lang="ko-KR" altLang="en-US" smtClean="0"/>
-              <a:t>2019-05-13</a:t>
+              <a:t>2019-05-21</a:t>
             </a:fld>
             <a:endParaRPr lang="ko-KR" altLang="en-US"/>
           </a:p>
@@ -612,7 +612,7 @@
           <a:p>
             <a:fld id="{3E65A532-31AC-44A0-9830-B02FFD8915AD}" type="datetimeFigureOut">
               <a:rPr lang="ko-KR" altLang="en-US" smtClean="0"/>
-              <a:t>2019-05-13</a:t>
+              <a:t>2019-05-21</a:t>
             </a:fld>
             <a:endParaRPr lang="ko-KR" altLang="en-US"/>
           </a:p>
@@ -782,7 +782,7 @@
           <a:p>
             <a:fld id="{3E65A532-31AC-44A0-9830-B02FFD8915AD}" type="datetimeFigureOut">
               <a:rPr lang="ko-KR" altLang="en-US" smtClean="0"/>
-              <a:t>2019-05-13</a:t>
+              <a:t>2019-05-21</a:t>
             </a:fld>
             <a:endParaRPr lang="ko-KR" altLang="en-US"/>
           </a:p>
@@ -962,7 +962,7 @@
           <a:p>
             <a:fld id="{3E65A532-31AC-44A0-9830-B02FFD8915AD}" type="datetimeFigureOut">
               <a:rPr lang="ko-KR" altLang="en-US" smtClean="0"/>
-              <a:t>2019-05-13</a:t>
+              <a:t>2019-05-21</a:t>
             </a:fld>
             <a:endParaRPr lang="ko-KR" altLang="en-US"/>
           </a:p>
@@ -1132,7 +1132,7 @@
           <a:p>
             <a:fld id="{3E65A532-31AC-44A0-9830-B02FFD8915AD}" type="datetimeFigureOut">
               <a:rPr lang="ko-KR" altLang="en-US" smtClean="0"/>
-              <a:t>2019-05-13</a:t>
+              <a:t>2019-05-21</a:t>
             </a:fld>
             <a:endParaRPr lang="ko-KR" altLang="en-US"/>
           </a:p>
@@ -1378,7 +1378,7 @@
           <a:p>
             <a:fld id="{3E65A532-31AC-44A0-9830-B02FFD8915AD}" type="datetimeFigureOut">
               <a:rPr lang="ko-KR" altLang="en-US" smtClean="0"/>
-              <a:t>2019-05-13</a:t>
+              <a:t>2019-05-21</a:t>
             </a:fld>
             <a:endParaRPr lang="ko-KR" altLang="en-US"/>
           </a:p>
@@ -1610,7 +1610,7 @@
           <a:p>
             <a:fld id="{3E65A532-31AC-44A0-9830-B02FFD8915AD}" type="datetimeFigureOut">
               <a:rPr lang="ko-KR" altLang="en-US" smtClean="0"/>
-              <a:t>2019-05-13</a:t>
+              <a:t>2019-05-21</a:t>
             </a:fld>
             <a:endParaRPr lang="ko-KR" altLang="en-US"/>
           </a:p>
@@ -1977,7 +1977,7 @@
           <a:p>
             <a:fld id="{3E65A532-31AC-44A0-9830-B02FFD8915AD}" type="datetimeFigureOut">
               <a:rPr lang="ko-KR" altLang="en-US" smtClean="0"/>
-              <a:t>2019-05-13</a:t>
+              <a:t>2019-05-21</a:t>
             </a:fld>
             <a:endParaRPr lang="ko-KR" altLang="en-US"/>
           </a:p>
@@ -2095,7 +2095,7 @@
           <a:p>
             <a:fld id="{3E65A532-31AC-44A0-9830-B02FFD8915AD}" type="datetimeFigureOut">
               <a:rPr lang="ko-KR" altLang="en-US" smtClean="0"/>
-              <a:t>2019-05-13</a:t>
+              <a:t>2019-05-21</a:t>
             </a:fld>
             <a:endParaRPr lang="ko-KR" altLang="en-US"/>
           </a:p>
@@ -2190,7 +2190,7 @@
           <a:p>
             <a:fld id="{3E65A532-31AC-44A0-9830-B02FFD8915AD}" type="datetimeFigureOut">
               <a:rPr lang="ko-KR" altLang="en-US" smtClean="0"/>
-              <a:t>2019-05-13</a:t>
+              <a:t>2019-05-21</a:t>
             </a:fld>
             <a:endParaRPr lang="ko-KR" altLang="en-US"/>
           </a:p>
@@ -2467,7 +2467,7 @@
           <a:p>
             <a:fld id="{3E65A532-31AC-44A0-9830-B02FFD8915AD}" type="datetimeFigureOut">
               <a:rPr lang="ko-KR" altLang="en-US" smtClean="0"/>
-              <a:t>2019-05-13</a:t>
+              <a:t>2019-05-21</a:t>
             </a:fld>
             <a:endParaRPr lang="ko-KR" altLang="en-US"/>
           </a:p>
@@ -2720,7 +2720,7 @@
           <a:p>
             <a:fld id="{3E65A532-31AC-44A0-9830-B02FFD8915AD}" type="datetimeFigureOut">
               <a:rPr lang="ko-KR" altLang="en-US" smtClean="0"/>
-              <a:t>2019-05-13</a:t>
+              <a:t>2019-05-21</a:t>
             </a:fld>
             <a:endParaRPr lang="ko-KR" altLang="en-US"/>
           </a:p>
@@ -2933,7 +2933,7 @@
           <a:p>
             <a:fld id="{3E65A532-31AC-44A0-9830-B02FFD8915AD}" type="datetimeFigureOut">
               <a:rPr lang="ko-KR" altLang="en-US" smtClean="0"/>
-              <a:t>2019-05-13</a:t>
+              <a:t>2019-05-21</a:t>
             </a:fld>
             <a:endParaRPr lang="ko-KR" altLang="en-US"/>
           </a:p>
@@ -5792,7 +5792,7 @@
         <p:spPr>
           <a:xfrm>
             <a:off x="421430" y="960702"/>
-            <a:ext cx="11424206" cy="5324535"/>
+            <a:ext cx="11424206" cy="5970865"/>
           </a:xfrm>
           <a:prstGeom prst="rect">
             <a:avLst/>
@@ -5810,8 +5810,16 @@
               <a:t>1. Envoy</a:t>
             </a:r>
             <a:r>
-              <a:rPr lang="ko-KR" altLang="en-US" sz="1400" smtClean="0"/>
-              <a:t>를 통한 요청이 실패난 경우</a:t>
+              <a:rPr lang="ko-KR" altLang="en-US" sz="1400" dirty="0" smtClean="0"/>
+              <a:t>를 통한 요청이 </a:t>
+            </a:r>
+            <a:r>
+              <a:rPr lang="ko-KR" altLang="en-US" sz="1400" dirty="0" err="1" smtClean="0"/>
+              <a:t>실패난</a:t>
+            </a:r>
+            <a:r>
+              <a:rPr lang="ko-KR" altLang="en-US" sz="1400" dirty="0" smtClean="0"/>
+              <a:t> 경우</a:t>
             </a:r>
             <a:endParaRPr lang="en-US" altLang="ko-KR" sz="1400" dirty="0" smtClean="0"/>
           </a:p>
@@ -5833,7 +5841,7 @@
               <a:t>Envoy</a:t>
             </a:r>
             <a:r>
-              <a:rPr lang="ko-KR" altLang="en-US" sz="1400" smtClean="0">
+              <a:rPr lang="ko-KR" altLang="en-US" sz="1400" dirty="0" smtClean="0">
                 <a:sym typeface="Wingdings" panose="05000000000000000000" pitchFamily="2" charset="2"/>
               </a:rPr>
               <a:t>의 </a:t>
@@ -5845,7 +5853,7 @@
               <a:t>access log</a:t>
             </a:r>
             <a:r>
-              <a:rPr lang="ko-KR" altLang="en-US" sz="1400" smtClean="0">
+              <a:rPr lang="ko-KR" altLang="en-US" sz="1400" dirty="0" smtClean="0">
                 <a:sym typeface="Wingdings" panose="05000000000000000000" pitchFamily="2" charset="2"/>
               </a:rPr>
               <a:t>를 확인해야 한다</a:t>
@@ -5900,7 +5908,7 @@
               <a:t>response code </a:t>
             </a:r>
             <a:r>
-              <a:rPr lang="ko-KR" altLang="en-US" sz="1400" smtClean="0">
+              <a:rPr lang="ko-KR" altLang="en-US" sz="1400" dirty="0" smtClean="0">
                 <a:sym typeface="Wingdings" panose="05000000000000000000" pitchFamily="2" charset="2"/>
               </a:rPr>
               <a:t>다음에는 </a:t>
@@ -5926,7 +5934,7 @@
               <a:t>status </a:t>
             </a:r>
             <a:r>
-              <a:rPr lang="ko-KR" altLang="en-US" sz="1400" smtClean="0"/>
+              <a:rPr lang="ko-KR" altLang="en-US" sz="1400" dirty="0" smtClean="0"/>
               <a:t>정보가 존재한다</a:t>
             </a:r>
             <a:r>
@@ -6043,78 +6051,60 @@
             </a:r>
           </a:p>
           <a:p>
+            <a:r>
+              <a:rPr lang="en-US" altLang="ko-KR" sz="1400" dirty="0" smtClean="0">
+                <a:sym typeface="Wingdings" panose="05000000000000000000" pitchFamily="2" charset="2"/>
+              </a:rPr>
+              <a:t>UH: </a:t>
+            </a:r>
+            <a:r>
+              <a:rPr lang="en-US" altLang="ko-KR" sz="1400" dirty="0"/>
+              <a:t>No healthy upstream hosts in upstream cluster in addition to 503 response code</a:t>
+            </a:r>
+            <a:r>
+              <a:rPr lang="en-US" altLang="ko-KR" sz="1400" dirty="0" smtClean="0"/>
+              <a:t>.</a:t>
+            </a:r>
+          </a:p>
+          <a:p>
             <a:endParaRPr lang="en-US" altLang="ko-KR" sz="1400" dirty="0">
               <a:sym typeface="Wingdings" panose="05000000000000000000" pitchFamily="2" charset="2"/>
             </a:endParaRPr>
           </a:p>
           <a:p>
             <a:r>
+              <a:rPr lang="ko-KR" altLang="en-US" sz="1400" dirty="0" smtClean="0">
+                <a:sym typeface="Wingdings" panose="05000000000000000000" pitchFamily="2" charset="2"/>
+              </a:rPr>
+              <a:t>기타 자세한 사항은 </a:t>
+            </a:r>
+            <a:r>
+              <a:rPr lang="en-US" altLang="ko-KR" sz="1400" dirty="0">
+                <a:hlinkClick r:id="rId2"/>
+              </a:rPr>
+              <a:t>https://</a:t>
+            </a:r>
+            <a:r>
               <a:rPr lang="en-US" altLang="ko-KR" sz="1400" dirty="0" smtClean="0">
-                <a:sym typeface="Wingdings" panose="05000000000000000000" pitchFamily="2" charset="2"/>
-              </a:rPr>
-              <a:t>&lt;</a:t>
+                <a:hlinkClick r:id="rId2"/>
+              </a:rPr>
+              <a:t>www.envoyproxy.io/docs/envoy/latest/configuration/access_log</a:t>
             </a:r>
             <a:r>
               <a:rPr lang="en-US" altLang="ko-KR" sz="1400" dirty="0" smtClean="0"/>
-              <a:t>Mixer </a:t>
-            </a:r>
-            <a:r>
-              <a:rPr lang="en-US" altLang="ko-KR" sz="1400" dirty="0"/>
-              <a:t>policy </a:t>
+              <a:t> </a:t>
+            </a:r>
+            <a:r>
+              <a:rPr lang="ko-KR" altLang="en-US" sz="1400" dirty="0" smtClean="0"/>
+              <a:t>참조한다</a:t>
             </a:r>
             <a:r>
               <a:rPr lang="en-US" altLang="ko-KR" sz="1400" dirty="0" smtClean="0"/>
-              <a:t>status&gt;</a:t>
-            </a:r>
-          </a:p>
-          <a:p>
-            <a:endParaRPr lang="en-US" altLang="ko-KR" sz="1400" dirty="0" smtClean="0"/>
-          </a:p>
-          <a:p>
-            <a:r>
-              <a:rPr lang="en-US" altLang="ko-KR" sz="1400" dirty="0">
-                <a:sym typeface="Wingdings" panose="05000000000000000000" pitchFamily="2" charset="2"/>
-              </a:rPr>
-              <a:t>UNAVAILABLE: Envoy cannot connect to Mixer and the policy is configured to fail close.</a:t>
-            </a:r>
-          </a:p>
-          <a:p>
-            <a:r>
-              <a:rPr lang="en-US" altLang="ko-KR" sz="1400" dirty="0">
-                <a:sym typeface="Wingdings" panose="05000000000000000000" pitchFamily="2" charset="2"/>
-              </a:rPr>
-              <a:t>UNAUTHENTICATED: The request is rejected by Mixer authentication.</a:t>
-            </a:r>
-          </a:p>
-          <a:p>
-            <a:r>
-              <a:rPr lang="en-US" altLang="ko-KR" sz="1400" dirty="0">
-                <a:sym typeface="Wingdings" panose="05000000000000000000" pitchFamily="2" charset="2"/>
-              </a:rPr>
-              <a:t>PERMISSION_DENIED: The request is rejected by Mixer authorization.</a:t>
-            </a:r>
-          </a:p>
-          <a:p>
-            <a:r>
-              <a:rPr lang="en-US" altLang="ko-KR" sz="1400" dirty="0">
-                <a:sym typeface="Wingdings" panose="05000000000000000000" pitchFamily="2" charset="2"/>
-              </a:rPr>
-              <a:t>RESOURCE_EXHAUSTED: The request is rejected by Mixer quota.</a:t>
-            </a:r>
-          </a:p>
-          <a:p>
-            <a:r>
-              <a:rPr lang="en-US" altLang="ko-KR" sz="1400" dirty="0">
-                <a:sym typeface="Wingdings" panose="05000000000000000000" pitchFamily="2" charset="2"/>
-              </a:rPr>
-              <a:t>INTERNAL: The request is rejected due to Mixer internal error</a:t>
-            </a:r>
-            <a:r>
-              <a:rPr lang="en-US" altLang="ko-KR" sz="1400" dirty="0" smtClean="0">
-                <a:sym typeface="Wingdings" panose="05000000000000000000" pitchFamily="2" charset="2"/>
-              </a:rPr>
               <a:t>.</a:t>
             </a:r>
+            <a:endParaRPr lang="en-US" altLang="ko-KR" sz="1400" dirty="0" smtClean="0">
+              <a:sym typeface="Wingdings" panose="05000000000000000000" pitchFamily="2" charset="2"/>
+            </a:endParaRPr>
           </a:p>
           <a:p>
             <a:endParaRPr lang="en-US" altLang="ko-KR" sz="1400" dirty="0">
@@ -6126,10 +6116,84 @@
               <a:rPr lang="en-US" altLang="ko-KR" sz="1400" dirty="0" smtClean="0">
                 <a:sym typeface="Wingdings" panose="05000000000000000000" pitchFamily="2" charset="2"/>
               </a:rPr>
+              <a:t>&lt;</a:t>
+            </a:r>
+            <a:r>
+              <a:rPr lang="en-US" altLang="ko-KR" sz="1400" dirty="0" smtClean="0"/>
+              <a:t>Mixer </a:t>
+            </a:r>
+            <a:r>
+              <a:rPr lang="en-US" altLang="ko-KR" sz="1400" dirty="0"/>
+              <a:t>policy </a:t>
+            </a:r>
+            <a:r>
+              <a:rPr lang="en-US" altLang="ko-KR" sz="1400" dirty="0" smtClean="0"/>
+              <a:t>status&gt;</a:t>
+            </a:r>
+          </a:p>
+          <a:p>
+            <a:endParaRPr lang="en-US" altLang="ko-KR" sz="1400" dirty="0" smtClean="0"/>
+          </a:p>
+          <a:p>
+            <a:r>
+              <a:rPr lang="en-US" altLang="ko-KR" sz="1400" dirty="0">
+                <a:sym typeface="Wingdings" panose="05000000000000000000" pitchFamily="2" charset="2"/>
+              </a:rPr>
+              <a:t>UNAVAILABLE: Envoy cannot connect to Mixer and the policy is configured to fail close.</a:t>
+            </a:r>
+          </a:p>
+          <a:p>
+            <a:r>
+              <a:rPr lang="en-US" altLang="ko-KR" sz="1400" dirty="0">
+                <a:sym typeface="Wingdings" panose="05000000000000000000" pitchFamily="2" charset="2"/>
+              </a:rPr>
+              <a:t>UNAUTHENTICATED: The request is rejected by Mixer authentication.</a:t>
+            </a:r>
+          </a:p>
+          <a:p>
+            <a:r>
+              <a:rPr lang="en-US" altLang="ko-KR" sz="1400" dirty="0">
+                <a:sym typeface="Wingdings" panose="05000000000000000000" pitchFamily="2" charset="2"/>
+              </a:rPr>
+              <a:t>PERMISSION_DENIED: The request is rejected by Mixer authorization.</a:t>
+            </a:r>
+          </a:p>
+          <a:p>
+            <a:r>
+              <a:rPr lang="en-US" altLang="ko-KR" sz="1400" dirty="0">
+                <a:sym typeface="Wingdings" panose="05000000000000000000" pitchFamily="2" charset="2"/>
+              </a:rPr>
+              <a:t>RESOURCE_EXHAUSTED: The request is rejected by Mixer quota.</a:t>
+            </a:r>
+          </a:p>
+          <a:p>
+            <a:r>
+              <a:rPr lang="en-US" altLang="ko-KR" sz="1400" dirty="0">
+                <a:sym typeface="Wingdings" panose="05000000000000000000" pitchFamily="2" charset="2"/>
+              </a:rPr>
+              <a:t>INTERNAL: The request is rejected due to Mixer internal error</a:t>
+            </a:r>
+            <a:r>
+              <a:rPr lang="en-US" altLang="ko-KR" sz="1400" dirty="0" smtClean="0">
+                <a:sym typeface="Wingdings" panose="05000000000000000000" pitchFamily="2" charset="2"/>
+              </a:rPr>
+              <a:t>.</a:t>
+            </a:r>
+          </a:p>
+          <a:p>
+            <a:endParaRPr lang="en-US" altLang="ko-KR" sz="1400" dirty="0">
+              <a:sym typeface="Wingdings" panose="05000000000000000000" pitchFamily="2" charset="2"/>
+            </a:endParaRPr>
+          </a:p>
+          <a:p>
+            <a:r>
+              <a:rPr lang="en-US" altLang="ko-KR" sz="1400" dirty="0" smtClean="0">
+                <a:sym typeface="Wingdings" panose="05000000000000000000" pitchFamily="2" charset="2"/>
+              </a:rPr>
               <a:t>2. Route Rule</a:t>
             </a:r>
             <a:r>
-              <a:rPr lang="ko-KR" altLang="en-US" sz="1400" smtClean="0">
+              <a:rPr lang="ko-KR" altLang="en-US" sz="1400" dirty="0" smtClean="0">
                 <a:sym typeface="Wingdings" panose="05000000000000000000" pitchFamily="2" charset="2"/>
               </a:rPr>
               <a:t>이 적용되지 않은 경우</a:t>
@@ -6156,7 +6220,7 @@
               <a:t>Envoy</a:t>
             </a:r>
             <a:r>
-              <a:rPr lang="ko-KR" altLang="en-US" sz="1400" smtClean="0">
+              <a:rPr lang="ko-KR" altLang="en-US" sz="1400" dirty="0" smtClean="0">
                 <a:sym typeface="Wingdings" panose="05000000000000000000" pitchFamily="2" charset="2"/>
               </a:rPr>
               <a:t>에 모든 </a:t>
@@ -6168,7 +6232,7 @@
               <a:t>Route Rule</a:t>
             </a:r>
             <a:r>
-              <a:rPr lang="ko-KR" altLang="en-US" sz="1400" smtClean="0">
+              <a:rPr lang="ko-KR" altLang="en-US" sz="1400" dirty="0" smtClean="0">
                 <a:sym typeface="Wingdings" panose="05000000000000000000" pitchFamily="2" charset="2"/>
               </a:rPr>
               <a:t>을 적용하기에 때때로 설정 적용이 늦어질 수 있다</a:t>
@@ -6198,13 +6262,13 @@
             </a:r>
             <a:r>
               <a:rPr lang="en-US" altLang="ko-KR" sz="1400" dirty="0">
-                <a:hlinkClick r:id="rId2"/>
+                <a:hlinkClick r:id="rId3"/>
               </a:rPr>
               <a:t>https://istio.io/help/ops/traffic-management/troubleshooting</a:t>
             </a:r>
             <a:r>
               <a:rPr lang="en-US" altLang="ko-KR" sz="1400" dirty="0" smtClean="0">
-                <a:hlinkClick r:id="rId2"/>
+                <a:hlinkClick r:id="rId3"/>
               </a:rPr>
               <a:t>/</a:t>
             </a:r>
@@ -6213,7 +6277,7 @@
               <a:t> </a:t>
             </a:r>
             <a:r>
-              <a:rPr lang="ko-KR" altLang="en-US" sz="1400" smtClean="0"/>
+              <a:rPr lang="ko-KR" altLang="en-US" sz="1400" dirty="0" smtClean="0"/>
               <a:t>참조한다</a:t>
             </a:r>
             <a:r>

</xml_diff>